<commit_message>
Update session 30 documents.
</commit_message>
<xml_diff>
--- a/CPSC-24700/Presentations/php.pptx
+++ b/CPSC-24700/Presentations/php.pptx
@@ -346,7 +346,7 @@
           <a:p>
             <a:fld id="{82AC26F5-A2E7-4901-A403-BBD25C17198C}" type="datetimeFigureOut">
               <a:rPr lang="en-US" smtClean="0"/>
-              <a:t>11/6/2017</a:t>
+              <a:t>11/7/2017</a:t>
             </a:fld>
             <a:endParaRPr lang="en-US"/>
           </a:p>
@@ -1677,7 +1677,7 @@
           <a:p>
             <a:fld id="{FB7712AD-3B21-4FE9-B722-CF9B0200D9B9}" type="datetimeFigureOut">
               <a:rPr lang="en-US" smtClean="0"/>
-              <a:t>11/6/2017</a:t>
+              <a:t>11/7/2017</a:t>
             </a:fld>
             <a:endParaRPr lang="en-US"/>
           </a:p>
@@ -1944,7 +1944,7 @@
           <a:p>
             <a:fld id="{FB7712AD-3B21-4FE9-B722-CF9B0200D9B9}" type="datetimeFigureOut">
               <a:rPr lang="en-US" smtClean="0"/>
-              <a:t>11/6/2017</a:t>
+              <a:t>11/7/2017</a:t>
             </a:fld>
             <a:endParaRPr lang="en-US"/>
           </a:p>
@@ -2124,7 +2124,7 @@
           <a:p>
             <a:fld id="{FB7712AD-3B21-4FE9-B722-CF9B0200D9B9}" type="datetimeFigureOut">
               <a:rPr lang="en-US" smtClean="0"/>
-              <a:t>11/6/2017</a:t>
+              <a:t>11/7/2017</a:t>
             </a:fld>
             <a:endParaRPr lang="en-US"/>
           </a:p>
@@ -2314,7 +2314,7 @@
           <a:p>
             <a:fld id="{FB7712AD-3B21-4FE9-B722-CF9B0200D9B9}" type="datetimeFigureOut">
               <a:rPr lang="en-US" smtClean="0"/>
-              <a:t>11/6/2017</a:t>
+              <a:t>11/7/2017</a:t>
             </a:fld>
             <a:endParaRPr lang="en-US"/>
           </a:p>
@@ -2491,7 +2491,7 @@
             <a:fld id="{30D555C0-8D4C-4003-BBC5-FFC41295F0C2}" type="datetimeFigureOut">
               <a:rPr lang="en-US" smtClean="0"/>
               <a:pPr/>
-              <a:t>11/6/2017</a:t>
+              <a:t>11/7/2017</a:t>
             </a:fld>
             <a:endParaRPr lang="en-US"/>
           </a:p>
@@ -2628,7 +2628,7 @@
           <a:p>
             <a:fld id="{FB7712AD-3B21-4FE9-B722-CF9B0200D9B9}" type="datetimeFigureOut">
               <a:rPr lang="en-US" smtClean="0"/>
-              <a:t>11/6/2017</a:t>
+              <a:t>11/7/2017</a:t>
             </a:fld>
             <a:endParaRPr lang="en-US"/>
           </a:p>
@@ -2867,7 +2867,7 @@
           <a:p>
             <a:fld id="{FB7712AD-3B21-4FE9-B722-CF9B0200D9B9}" type="datetimeFigureOut">
               <a:rPr lang="en-US" smtClean="0"/>
-              <a:t>11/6/2017</a:t>
+              <a:t>11/7/2017</a:t>
             </a:fld>
             <a:endParaRPr lang="en-US"/>
           </a:p>
@@ -3070,7 +3070,7 @@
           <a:p>
             <a:fld id="{FB7712AD-3B21-4FE9-B722-CF9B0200D9B9}" type="datetimeFigureOut">
               <a:rPr lang="en-US" smtClean="0"/>
-              <a:t>11/6/2017</a:t>
+              <a:t>11/7/2017</a:t>
             </a:fld>
             <a:endParaRPr lang="en-US"/>
           </a:p>
@@ -3367,7 +3367,7 @@
           <a:p>
             <a:fld id="{FB7712AD-3B21-4FE9-B722-CF9B0200D9B9}" type="datetimeFigureOut">
               <a:rPr lang="en-US" smtClean="0"/>
-              <a:t>11/6/2017</a:t>
+              <a:t>11/7/2017</a:t>
             </a:fld>
             <a:endParaRPr lang="en-US"/>
           </a:p>
@@ -3803,7 +3803,7 @@
           <a:p>
             <a:fld id="{FB7712AD-3B21-4FE9-B722-CF9B0200D9B9}" type="datetimeFigureOut">
               <a:rPr lang="en-US" smtClean="0"/>
-              <a:t>11/6/2017</a:t>
+              <a:t>11/7/2017</a:t>
             </a:fld>
             <a:endParaRPr lang="en-US"/>
           </a:p>
@@ -3932,7 +3932,7 @@
           <a:p>
             <a:fld id="{FB7712AD-3B21-4FE9-B722-CF9B0200D9B9}" type="datetimeFigureOut">
               <a:rPr lang="en-US" smtClean="0"/>
-              <a:t>11/6/2017</a:t>
+              <a:t>11/7/2017</a:t>
             </a:fld>
             <a:endParaRPr lang="en-US"/>
           </a:p>
@@ -4039,7 +4039,7 @@
           <a:p>
             <a:fld id="{FB7712AD-3B21-4FE9-B722-CF9B0200D9B9}" type="datetimeFigureOut">
               <a:rPr lang="en-US" smtClean="0"/>
-              <a:t>11/6/2017</a:t>
+              <a:t>11/7/2017</a:t>
             </a:fld>
             <a:endParaRPr lang="en-US"/>
           </a:p>
@@ -4326,7 +4326,7 @@
           <a:p>
             <a:fld id="{FB7712AD-3B21-4FE9-B722-CF9B0200D9B9}" type="datetimeFigureOut">
               <a:rPr lang="en-US" smtClean="0"/>
-              <a:t>11/6/2017</a:t>
+              <a:t>11/7/2017</a:t>
             </a:fld>
             <a:endParaRPr lang="en-US"/>
           </a:p>
@@ -4652,7 +4652,7 @@
           <a:p>
             <a:fld id="{FB7712AD-3B21-4FE9-B722-CF9B0200D9B9}" type="datetimeFigureOut">
               <a:rPr lang="en-US" smtClean="0"/>
-              <a:t>11/6/2017</a:t>
+              <a:t>11/7/2017</a:t>
             </a:fld>
             <a:endParaRPr lang="en-US"/>
           </a:p>

</xml_diff>

<commit_message>
Update session 33 documents.
</commit_message>
<xml_diff>
--- a/CPSC-24700/Presentations/php.pptx
+++ b/CPSC-24700/Presentations/php.pptx
@@ -350,7 +350,7 @@
           <a:p>
             <a:fld id="{82AC26F5-A2E7-4901-A403-BBD25C17198C}" type="datetimeFigureOut">
               <a:rPr lang="en-US" smtClean="0"/>
-              <a:t>11/13/2017</a:t>
+              <a:t>11/14/2017</a:t>
             </a:fld>
             <a:endParaRPr lang="en-US"/>
           </a:p>
@@ -2053,7 +2053,7 @@
           <a:p>
             <a:fld id="{FB7712AD-3B21-4FE9-B722-CF9B0200D9B9}" type="datetimeFigureOut">
               <a:rPr lang="en-US" smtClean="0"/>
-              <a:t>11/13/2017</a:t>
+              <a:t>11/14/2017</a:t>
             </a:fld>
             <a:endParaRPr lang="en-US"/>
           </a:p>
@@ -2320,7 +2320,7 @@
           <a:p>
             <a:fld id="{FB7712AD-3B21-4FE9-B722-CF9B0200D9B9}" type="datetimeFigureOut">
               <a:rPr lang="en-US" smtClean="0"/>
-              <a:t>11/13/2017</a:t>
+              <a:t>11/14/2017</a:t>
             </a:fld>
             <a:endParaRPr lang="en-US"/>
           </a:p>
@@ -2500,7 +2500,7 @@
           <a:p>
             <a:fld id="{FB7712AD-3B21-4FE9-B722-CF9B0200D9B9}" type="datetimeFigureOut">
               <a:rPr lang="en-US" smtClean="0"/>
-              <a:t>11/13/2017</a:t>
+              <a:t>11/14/2017</a:t>
             </a:fld>
             <a:endParaRPr lang="en-US"/>
           </a:p>
@@ -2690,7 +2690,7 @@
           <a:p>
             <a:fld id="{FB7712AD-3B21-4FE9-B722-CF9B0200D9B9}" type="datetimeFigureOut">
               <a:rPr lang="en-US" smtClean="0"/>
-              <a:t>11/13/2017</a:t>
+              <a:t>11/14/2017</a:t>
             </a:fld>
             <a:endParaRPr lang="en-US"/>
           </a:p>
@@ -2867,7 +2867,7 @@
             <a:fld id="{30D555C0-8D4C-4003-BBC5-FFC41295F0C2}" type="datetimeFigureOut">
               <a:rPr lang="en-US" smtClean="0"/>
               <a:pPr/>
-              <a:t>11/13/2017</a:t>
+              <a:t>11/14/2017</a:t>
             </a:fld>
             <a:endParaRPr lang="en-US"/>
           </a:p>
@@ -3076,7 +3076,7 @@
           <a:p>
             <a:fld id="{5FB62F81-FD80-4AA8-93CA-E835B40BE667}" type="datetimeFigureOut">
               <a:rPr lang="en-US" smtClean="0"/>
-              <a:t>11/13/2017</a:t>
+              <a:t>11/14/2017</a:t>
             </a:fld>
             <a:endParaRPr lang="en-US"/>
           </a:p>
@@ -3274,7 +3274,7 @@
           <a:p>
             <a:fld id="{5FB62F81-FD80-4AA8-93CA-E835B40BE667}" type="datetimeFigureOut">
               <a:rPr lang="en-US" smtClean="0"/>
-              <a:t>11/13/2017</a:t>
+              <a:t>11/14/2017</a:t>
             </a:fld>
             <a:endParaRPr lang="en-US"/>
           </a:p>
@@ -3549,7 +3549,7 @@
           <a:p>
             <a:fld id="{5FB62F81-FD80-4AA8-93CA-E835B40BE667}" type="datetimeFigureOut">
               <a:rPr lang="en-US" smtClean="0"/>
-              <a:t>11/13/2017</a:t>
+              <a:t>11/14/2017</a:t>
             </a:fld>
             <a:endParaRPr lang="en-US"/>
           </a:p>
@@ -3814,7 +3814,7 @@
           <a:p>
             <a:fld id="{5FB62F81-FD80-4AA8-93CA-E835B40BE667}" type="datetimeFigureOut">
               <a:rPr lang="en-US" smtClean="0"/>
-              <a:t>11/13/2017</a:t>
+              <a:t>11/14/2017</a:t>
             </a:fld>
             <a:endParaRPr lang="en-US"/>
           </a:p>
@@ -4226,7 +4226,7 @@
           <a:p>
             <a:fld id="{5FB62F81-FD80-4AA8-93CA-E835B40BE667}" type="datetimeFigureOut">
               <a:rPr lang="en-US" smtClean="0"/>
-              <a:t>11/13/2017</a:t>
+              <a:t>11/14/2017</a:t>
             </a:fld>
             <a:endParaRPr lang="en-US"/>
           </a:p>
@@ -4367,7 +4367,7 @@
           <a:p>
             <a:fld id="{5FB62F81-FD80-4AA8-93CA-E835B40BE667}" type="datetimeFigureOut">
               <a:rPr lang="en-US" smtClean="0"/>
-              <a:t>11/13/2017</a:t>
+              <a:t>11/14/2017</a:t>
             </a:fld>
             <a:endParaRPr lang="en-US"/>
           </a:p>
@@ -4515,7 +4515,7 @@
           <a:p>
             <a:fld id="{FB7712AD-3B21-4FE9-B722-CF9B0200D9B9}" type="datetimeFigureOut">
               <a:rPr lang="en-US" smtClean="0"/>
-              <a:t>11/13/2017</a:t>
+              <a:t>11/14/2017</a:t>
             </a:fld>
             <a:endParaRPr lang="en-US"/>
           </a:p>
@@ -4624,7 +4624,7 @@
           <a:p>
             <a:fld id="{5FB62F81-FD80-4AA8-93CA-E835B40BE667}" type="datetimeFigureOut">
               <a:rPr lang="en-US" smtClean="0"/>
-              <a:t>11/13/2017</a:t>
+              <a:t>11/14/2017</a:t>
             </a:fld>
             <a:endParaRPr lang="en-US"/>
           </a:p>
@@ -4935,7 +4935,7 @@
           <a:p>
             <a:fld id="{5FB62F81-FD80-4AA8-93CA-E835B40BE667}" type="datetimeFigureOut">
               <a:rPr lang="en-US" smtClean="0"/>
-              <a:t>11/13/2017</a:t>
+              <a:t>11/14/2017</a:t>
             </a:fld>
             <a:endParaRPr lang="en-US"/>
           </a:p>
@@ -5223,7 +5223,7 @@
           <a:p>
             <a:fld id="{5FB62F81-FD80-4AA8-93CA-E835B40BE667}" type="datetimeFigureOut">
               <a:rPr lang="en-US" smtClean="0"/>
-              <a:t>11/13/2017</a:t>
+              <a:t>11/14/2017</a:t>
             </a:fld>
             <a:endParaRPr lang="en-US"/>
           </a:p>
@@ -5421,7 +5421,7 @@
           <a:p>
             <a:fld id="{5FB62F81-FD80-4AA8-93CA-E835B40BE667}" type="datetimeFigureOut">
               <a:rPr lang="en-US" smtClean="0"/>
-              <a:t>11/13/2017</a:t>
+              <a:t>11/14/2017</a:t>
             </a:fld>
             <a:endParaRPr lang="en-US"/>
           </a:p>
@@ -5629,7 +5629,7 @@
           <a:p>
             <a:fld id="{5FB62F81-FD80-4AA8-93CA-E835B40BE667}" type="datetimeFigureOut">
               <a:rPr lang="en-US" smtClean="0"/>
-              <a:t>11/13/2017</a:t>
+              <a:t>11/14/2017</a:t>
             </a:fld>
             <a:endParaRPr lang="en-US"/>
           </a:p>
@@ -5872,7 +5872,7 @@
           <a:p>
             <a:fld id="{FB7712AD-3B21-4FE9-B722-CF9B0200D9B9}" type="datetimeFigureOut">
               <a:rPr lang="en-US" smtClean="0"/>
-              <a:t>11/13/2017</a:t>
+              <a:t>11/14/2017</a:t>
             </a:fld>
             <a:endParaRPr lang="en-US"/>
           </a:p>
@@ -6075,7 +6075,7 @@
           <a:p>
             <a:fld id="{FB7712AD-3B21-4FE9-B722-CF9B0200D9B9}" type="datetimeFigureOut">
               <a:rPr lang="en-US" smtClean="0"/>
-              <a:t>11/13/2017</a:t>
+              <a:t>11/14/2017</a:t>
             </a:fld>
             <a:endParaRPr lang="en-US"/>
           </a:p>
@@ -6372,7 +6372,7 @@
           <a:p>
             <a:fld id="{FB7712AD-3B21-4FE9-B722-CF9B0200D9B9}" type="datetimeFigureOut">
               <a:rPr lang="en-US" smtClean="0"/>
-              <a:t>11/13/2017</a:t>
+              <a:t>11/14/2017</a:t>
             </a:fld>
             <a:endParaRPr lang="en-US"/>
           </a:p>
@@ -6808,7 +6808,7 @@
           <a:p>
             <a:fld id="{FB7712AD-3B21-4FE9-B722-CF9B0200D9B9}" type="datetimeFigureOut">
               <a:rPr lang="en-US" smtClean="0"/>
-              <a:t>11/13/2017</a:t>
+              <a:t>11/14/2017</a:t>
             </a:fld>
             <a:endParaRPr lang="en-US"/>
           </a:p>
@@ -6937,7 +6937,7 @@
           <a:p>
             <a:fld id="{FB7712AD-3B21-4FE9-B722-CF9B0200D9B9}" type="datetimeFigureOut">
               <a:rPr lang="en-US" smtClean="0"/>
-              <a:t>11/13/2017</a:t>
+              <a:t>11/14/2017</a:t>
             </a:fld>
             <a:endParaRPr lang="en-US"/>
           </a:p>
@@ -7044,7 +7044,7 @@
           <a:p>
             <a:fld id="{FB7712AD-3B21-4FE9-B722-CF9B0200D9B9}" type="datetimeFigureOut">
               <a:rPr lang="en-US" smtClean="0"/>
-              <a:t>11/13/2017</a:t>
+              <a:t>11/14/2017</a:t>
             </a:fld>
             <a:endParaRPr lang="en-US"/>
           </a:p>
@@ -7331,7 +7331,7 @@
           <a:p>
             <a:fld id="{FB7712AD-3B21-4FE9-B722-CF9B0200D9B9}" type="datetimeFigureOut">
               <a:rPr lang="en-US" smtClean="0"/>
-              <a:t>11/13/2017</a:t>
+              <a:t>11/14/2017</a:t>
             </a:fld>
             <a:endParaRPr lang="en-US"/>
           </a:p>
@@ -7657,7 +7657,7 @@
           <a:p>
             <a:fld id="{FB7712AD-3B21-4FE9-B722-CF9B0200D9B9}" type="datetimeFigureOut">
               <a:rPr lang="en-US" smtClean="0"/>
-              <a:t>11/13/2017</a:t>
+              <a:t>11/14/2017</a:t>
             </a:fld>
             <a:endParaRPr lang="en-US"/>
           </a:p>
@@ -8358,7 +8358,7 @@
           <a:p>
             <a:fld id="{5FB62F81-FD80-4AA8-93CA-E835B40BE667}" type="datetimeFigureOut">
               <a:rPr lang="en-US" smtClean="0"/>
-              <a:t>11/13/2017</a:t>
+              <a:t>11/14/2017</a:t>
             </a:fld>
             <a:endParaRPr lang="en-US"/>
           </a:p>
@@ -10875,7 +10875,7 @@
           <a:p>
             <a:r>
               <a:rPr lang="en-US" sz="3600" dirty="0"/>
-              <a:t>End of Session</a:t>
+              <a:t>Begin Session</a:t>
             </a:r>
           </a:p>
         </p:txBody>

</xml_diff>